<commit_message>
update intro slides with acknowledgements
</commit_message>
<xml_diff>
--- a/admin/intro_slides/hackathon_intro_slides.pptx
+++ b/admin/intro_slides/hackathon_intro_slides.pptx
@@ -516,6 +516,128 @@
 </p:notesMaster>
 </file>
 
+<file path=ppt/notesSlides/notesSlide1.xml><?xml version="1.0" encoding="utf-8"?>
+<p:notes xmlns:a="http://schemas.openxmlformats.org/drawingml/2006/main" xmlns:r="http://schemas.openxmlformats.org/officeDocument/2006/relationships" xmlns:p="http://schemas.openxmlformats.org/presentationml/2006/main">
+  <p:cSld>
+    <p:spTree>
+      <p:nvGrpSpPr>
+        <p:cNvPr id="1" name=""/>
+        <p:cNvGrpSpPr/>
+        <p:nvPr/>
+      </p:nvGrpSpPr>
+      <p:grpSpPr>
+        <a:xfrm>
+          <a:off x="0" y="0"/>
+          <a:ext cx="0" cy="0"/>
+          <a:chOff x="0" y="0"/>
+          <a:chExt cx="0" cy="0"/>
+        </a:xfrm>
+      </p:grpSpPr>
+      <p:sp>
+        <p:nvSpPr>
+          <p:cNvPr id="2" name="Slide Image Placeholder 1"/>
+          <p:cNvSpPr>
+            <a:spLocks noGrp="1" noRot="1" noChangeAspect="1"/>
+          </p:cNvSpPr>
+          <p:nvPr>
+            <p:ph type="sldImg"/>
+          </p:nvPr>
+        </p:nvSpPr>
+        <p:spPr/>
+      </p:sp>
+      <p:sp>
+        <p:nvSpPr>
+          <p:cNvPr id="3" name="Notes Placeholder 2"/>
+          <p:cNvSpPr>
+            <a:spLocks noGrp="1"/>
+          </p:cNvSpPr>
+          <p:nvPr>
+            <p:ph type="body" idx="1"/>
+          </p:nvPr>
+        </p:nvSpPr>
+        <p:spPr/>
+        <p:txBody>
+          <a:bodyPr/>
+          <a:lstStyle/>
+          <a:p>
+            <a:endParaRPr lang="en-US" dirty="0"/>
+          </a:p>
+        </p:txBody>
+      </p:sp>
+    </p:spTree>
+    <p:extLst>
+      <p:ext uri="{BB962C8B-B14F-4D97-AF65-F5344CB8AC3E}">
+        <p14:creationId xmlns:p14="http://schemas.microsoft.com/office/powerpoint/2010/main" val="449050601"/>
+      </p:ext>
+    </p:extLst>
+  </p:cSld>
+  <p:clrMapOvr>
+    <a:masterClrMapping/>
+  </p:clrMapOvr>
+</p:notes>
+</file>
+
+<file path=ppt/notesSlides/notesSlide2.xml><?xml version="1.0" encoding="utf-8"?>
+<p:notes xmlns:a="http://schemas.openxmlformats.org/drawingml/2006/main" xmlns:r="http://schemas.openxmlformats.org/officeDocument/2006/relationships" xmlns:p="http://schemas.openxmlformats.org/presentationml/2006/main">
+  <p:cSld>
+    <p:spTree>
+      <p:nvGrpSpPr>
+        <p:cNvPr id="1" name=""/>
+        <p:cNvGrpSpPr/>
+        <p:nvPr/>
+      </p:nvGrpSpPr>
+      <p:grpSpPr>
+        <a:xfrm>
+          <a:off x="0" y="0"/>
+          <a:ext cx="0" cy="0"/>
+          <a:chOff x="0" y="0"/>
+          <a:chExt cx="0" cy="0"/>
+        </a:xfrm>
+      </p:grpSpPr>
+      <p:sp>
+        <p:nvSpPr>
+          <p:cNvPr id="2" name="Slide Image Placeholder 1"/>
+          <p:cNvSpPr>
+            <a:spLocks noGrp="1" noRot="1" noChangeAspect="1"/>
+          </p:cNvSpPr>
+          <p:nvPr>
+            <p:ph type="sldImg"/>
+          </p:nvPr>
+        </p:nvSpPr>
+        <p:spPr/>
+      </p:sp>
+      <p:sp>
+        <p:nvSpPr>
+          <p:cNvPr id="3" name="Notes Placeholder 2"/>
+          <p:cNvSpPr>
+            <a:spLocks noGrp="1"/>
+          </p:cNvSpPr>
+          <p:nvPr>
+            <p:ph type="body" idx="1"/>
+          </p:nvPr>
+        </p:nvSpPr>
+        <p:spPr/>
+        <p:txBody>
+          <a:bodyPr/>
+          <a:lstStyle/>
+          <a:p>
+            <a:endParaRPr lang="en-US" dirty="0"/>
+          </a:p>
+        </p:txBody>
+      </p:sp>
+    </p:spTree>
+    <p:extLst>
+      <p:ext uri="{BB962C8B-B14F-4D97-AF65-F5344CB8AC3E}">
+        <p14:creationId xmlns:p14="http://schemas.microsoft.com/office/powerpoint/2010/main" val="2456494772"/>
+      </p:ext>
+    </p:extLst>
+  </p:cSld>
+  <p:clrMapOvr>
+    <a:masterClrMapping/>
+  </p:clrMapOvr>
+</p:notes>
+</file>
+
 <file path=ppt/slideLayouts/slideLayout1.xml><?xml version="1.0" encoding="utf-8"?>
 <p:sldLayout xmlns:a="http://schemas.openxmlformats.org/drawingml/2006/main" xmlns:r="http://schemas.openxmlformats.org/officeDocument/2006/relationships" xmlns:p="http://schemas.openxmlformats.org/presentationml/2006/main" type="title">
   <p:cSld name="Title &amp; Subtitle">
@@ -2161,7 +2283,7 @@
           </a:ln>
           <a:extLst>
             <a:ext uri="{C572A759-6A51-4108-AA02-DFA0A04FC94B}">
-              <ma14:wrappingTextBoxFlag xmlns:ma14="http://schemas.microsoft.com/office/mac/drawingml/2011/main" xmlns:a14="http://schemas.microsoft.com/office/drawing/2010/main" xmlns:m="http://schemas.openxmlformats.org/officeDocument/2006/math" xmlns="" val="1"/>
+              <ma14:wrappingTextBoxFlag xmlns="" xmlns:m="http://schemas.openxmlformats.org/officeDocument/2006/math" xmlns:a14="http://schemas.microsoft.com/office/drawing/2010/main" xmlns:ma14="http://schemas.microsoft.com/office/mac/drawingml/2011/main" val="1"/>
             </a:ext>
           </a:extLst>
         </p:spPr>
@@ -2200,7 +2322,7 @@
           </a:ln>
           <a:extLst>
             <a:ext uri="{C572A759-6A51-4108-AA02-DFA0A04FC94B}">
-              <ma14:wrappingTextBoxFlag xmlns:ma14="http://schemas.microsoft.com/office/mac/drawingml/2011/main" xmlns:a14="http://schemas.microsoft.com/office/drawing/2010/main" xmlns:m="http://schemas.openxmlformats.org/officeDocument/2006/math" xmlns="" val="1"/>
+              <ma14:wrappingTextBoxFlag xmlns="" xmlns:m="http://schemas.openxmlformats.org/officeDocument/2006/math" xmlns:a14="http://schemas.microsoft.com/office/drawing/2010/main" xmlns:ma14="http://schemas.microsoft.com/office/mac/drawingml/2011/main" val="1"/>
             </a:ext>
           </a:extLst>
         </p:spPr>
@@ -3489,7 +3611,7 @@
             </a:r>
             <a:r>
               <a:rPr lang="en-US" dirty="0"/>
-              <a:t> Mobile</a:t>
+              <a:t> Mobile.</a:t>
             </a:r>
           </a:p>
           <a:p>
@@ -3503,12 +3625,15 @@
               </a:rPr>
               <a:t>https://oit.uci.edu/reg</a:t>
             </a:r>
-            <a:endParaRPr lang="en-US" dirty="0"/>
-          </a:p>
-          <a:p>
             <a:r>
               <a:rPr lang="en-US" dirty="0"/>
-              <a:t>Register your device as a guest</a:t>
+              <a:t>.</a:t>
+            </a:r>
+          </a:p>
+          <a:p>
+            <a:r>
+              <a:rPr lang="en-US" dirty="0"/>
+              <a:t>Register your device as a guest.</a:t>
             </a:r>
           </a:p>
           <a:p>
@@ -3620,47 +3745,15 @@
           <a:p>
             <a:r>
               <a:rPr lang="en-US" dirty="0"/>
-              <a:t>Slack Group Sign-up: </a:t>
-            </a:r>
-            <a:r>
-              <a:rPr lang="en-US" dirty="0">
-                <a:highlight>
-                  <a:srgbClr val="FFFF00"/>
-                </a:highlight>
-              </a:rPr>
-              <a:t>https://</a:t>
-            </a:r>
-            <a:r>
-              <a:rPr lang="en-US" dirty="0" err="1">
-                <a:highlight>
-                  <a:srgbClr val="FFFF00"/>
-                </a:highlight>
-              </a:rPr>
+              <a:t>Slack Group Sign-up: https://</a:t>
+            </a:r>
+            <a:r>
+              <a:rPr lang="en-US" dirty="0" err="1"/>
               <a:t>tinyurl.com</a:t>
             </a:r>
             <a:r>
-              <a:rPr lang="en-US" dirty="0">
-                <a:highlight>
-                  <a:srgbClr val="FFFF00"/>
-                </a:highlight>
-              </a:rPr>
-              <a:t>/</a:t>
-            </a:r>
-            <a:r>
-              <a:rPr lang="en-US" dirty="0" err="1">
-                <a:highlight>
-                  <a:srgbClr val="FFFF00"/>
-                </a:highlight>
-              </a:rPr>
-              <a:t>socalrug</a:t>
-            </a:r>
-            <a:r>
-              <a:rPr lang="en-US" dirty="0">
-                <a:highlight>
-                  <a:srgbClr val="FFFF00"/>
-                </a:highlight>
-              </a:rPr>
-              <a:t>-slack-signup</a:t>
+              <a:rPr lang="en-US" dirty="0"/>
+              <a:t>/socalrug-slack-invite3</a:t>
             </a:r>
           </a:p>
           <a:p>
@@ -3793,7 +3886,7 @@
           </a:ln>
           <a:extLst>
             <a:ext uri="{C572A759-6A51-4108-AA02-DFA0A04FC94B}">
-              <ma14:wrappingTextBoxFlag xmlns:ma14="http://schemas.microsoft.com/office/mac/drawingml/2011/main" xmlns:a14="http://schemas.microsoft.com/office/drawing/2010/main" xmlns:m="http://schemas.openxmlformats.org/officeDocument/2006/math" xmlns="" val="1"/>
+              <ma14:wrappingTextBoxFlag xmlns="" xmlns:m="http://schemas.openxmlformats.org/officeDocument/2006/math" xmlns:a14="http://schemas.microsoft.com/office/drawing/2010/main" xmlns:ma14="http://schemas.microsoft.com/office/mac/drawingml/2011/main" val="1"/>
             </a:ext>
           </a:extLst>
         </p:spPr>
@@ -3832,7 +3925,7 @@
           </a:ln>
           <a:extLst>
             <a:ext uri="{C572A759-6A51-4108-AA02-DFA0A04FC94B}">
-              <ma14:wrappingTextBoxFlag xmlns:ma14="http://schemas.microsoft.com/office/mac/drawingml/2011/main" xmlns:a14="http://schemas.microsoft.com/office/drawing/2010/main" xmlns:m="http://schemas.openxmlformats.org/officeDocument/2006/math" xmlns="" val="1"/>
+              <ma14:wrappingTextBoxFlag xmlns="" xmlns:m="http://schemas.openxmlformats.org/officeDocument/2006/math" xmlns:a14="http://schemas.microsoft.com/office/drawing/2010/main" xmlns:ma14="http://schemas.microsoft.com/office/mac/drawingml/2011/main" val="1"/>
             </a:ext>
           </a:extLst>
         </p:spPr>
@@ -4004,7 +4097,7 @@
       </p:pic>
       <p:pic>
         <p:nvPicPr>
-          <p:cNvPr id="164" name="RStudio-Logo-Blue-Gray-250.png" descr="RStudio-Logo-Blue-Gray-250.png"/>
+          <p:cNvPr id="166" name="taylorf.pdf" descr="taylorf.pdf"/>
           <p:cNvPicPr>
             <a:picLocks noChangeAspect="1"/>
           </p:cNvPicPr>
@@ -4018,8 +4111,8 @@
         </p:blipFill>
         <p:spPr>
           <a:xfrm>
-            <a:off x="7523209" y="4322158"/>
-            <a:ext cx="4049361" cy="1425376"/>
+            <a:off x="742950" y="5942632"/>
+            <a:ext cx="6471792" cy="1727889"/>
           </a:xfrm>
           <a:prstGeom prst="rect">
             <a:avLst/>
@@ -4031,7 +4124,7 @@
       </p:pic>
       <p:pic>
         <p:nvPicPr>
-          <p:cNvPr id="166" name="taylorf.pdf" descr="taylorf.pdf"/>
+          <p:cNvPr id="164" name="RStudio-Logo-Blue-Gray-250.png" descr="RStudio-Logo-Blue-Gray-250.png"/>
           <p:cNvPicPr>
             <a:picLocks noChangeAspect="1"/>
           </p:cNvPicPr>
@@ -4045,8 +4138,8 @@
         </p:blipFill>
         <p:spPr>
           <a:xfrm>
-            <a:off x="730227" y="4953281"/>
-            <a:ext cx="6471792" cy="1727889"/>
+            <a:off x="6853040" y="6547102"/>
+            <a:ext cx="5389700" cy="1897176"/>
           </a:xfrm>
           <a:prstGeom prst="rect">
             <a:avLst/>
@@ -4054,42 +4147,6 @@
           <a:ln w="12700">
             <a:miter lim="400000"/>
           </a:ln>
-        </p:spPr>
-      </p:pic>
-      <p:pic>
-        <p:nvPicPr>
-          <p:cNvPr id="3" name="Picture 2" descr="A picture containing logo&#10;&#10;Description automatically generated">
-            <a:extLst>
-              <a:ext uri="{FF2B5EF4-FFF2-40B4-BE49-F238E27FC236}">
-                <a16:creationId xmlns:a16="http://schemas.microsoft.com/office/drawing/2014/main" id="{30DC4FE6-56AD-E446-B8BF-A67A0A1DBCB2}"/>
-              </a:ext>
-            </a:extLst>
-          </p:cNvPr>
-          <p:cNvPicPr>
-            <a:picLocks noChangeAspect="1"/>
-          </p:cNvPicPr>
-          <p:nvPr/>
-        </p:nvPicPr>
-        <p:blipFill>
-          <a:blip r:embed="rId6">
-            <a:extLst>
-              <a:ext uri="{28A0092B-C50C-407E-A947-70E740481C1C}">
-                <a14:useLocalDpi xmlns:a14="http://schemas.microsoft.com/office/drawing/2010/main" val="0"/>
-              </a:ext>
-            </a:extLst>
-          </a:blip>
-          <a:stretch>
-            <a:fillRect/>
-          </a:stretch>
-        </p:blipFill>
-        <p:spPr>
-          <a:xfrm>
-            <a:off x="742950" y="6302073"/>
-            <a:ext cx="4834953" cy="1538394"/>
-          </a:xfrm>
-          <a:prstGeom prst="rect">
-            <a:avLst/>
-          </a:prstGeom>
         </p:spPr>
       </p:pic>
     </p:spTree>
@@ -4166,7 +4223,7 @@
           </a:ln>
           <a:extLst>
             <a:ext uri="{C572A759-6A51-4108-AA02-DFA0A04FC94B}">
-              <ma14:wrappingTextBoxFlag xmlns:ma14="http://schemas.microsoft.com/office/mac/drawingml/2011/main" xmlns:a14="http://schemas.microsoft.com/office/drawing/2010/main" xmlns:m="http://schemas.openxmlformats.org/officeDocument/2006/math" xmlns="" val="1"/>
+              <ma14:wrappingTextBoxFlag xmlns="" xmlns:m="http://schemas.openxmlformats.org/officeDocument/2006/math" xmlns:a14="http://schemas.microsoft.com/office/drawing/2010/main" xmlns:ma14="http://schemas.microsoft.com/office/mac/drawingml/2011/main" val="1"/>
             </a:ext>
           </a:extLst>
         </p:spPr>
@@ -4199,7 +4256,7 @@
           <p:nvPr/>
         </p:nvPicPr>
         <p:blipFill>
-          <a:blip r:embed="rId2">
+          <a:blip r:embed="rId3">
             <a:extLst>
               <a:ext uri="{28A0092B-C50C-407E-A947-70E740481C1C}">
                 <a14:useLocalDpi xmlns:a14="http://schemas.microsoft.com/office/drawing/2010/main" val="0"/>
@@ -4604,13 +4661,14 @@
               <a:defRPr sz="3040"/>
             </a:pPr>
             <a:r>
-              <a:rPr lang="en-US" sz="3040" dirty="0">
-                <a:highlight>
-                  <a:srgbClr val="FFFF00"/>
-                </a:highlight>
-              </a:rPr>
-              <a:t>JOHN TO UPDATE</a:t>
-            </a:r>
+              <a:rPr lang="en-US" sz="3040" dirty="0"/>
+              <a:t>Bryan Travis Smith, Chris Pounds, Dwight Wynne, Gerardo </a:t>
+            </a:r>
+            <a:r>
+              <a:rPr lang="en-US" sz="3040" dirty="0" err="1"/>
+              <a:t>Okhuysen</a:t>
+            </a:r>
+            <a:endParaRPr lang="en-US" sz="3040" dirty="0"/>
           </a:p>
         </p:txBody>
       </p:sp>
@@ -4886,12 +4944,76 @@
               <a:defRPr sz="3040"/>
             </a:pPr>
             <a:r>
-              <a:rPr lang="en-US" sz="2400" dirty="0">
-                <a:highlight>
-                  <a:srgbClr val="FFFF00"/>
-                </a:highlight>
-              </a:rPr>
-              <a:t>JOHN TO UPDATE</a:t>
+              <a:rPr lang="en-US" sz="2400" dirty="0" err="1"/>
+              <a:t>Anuja</a:t>
+            </a:r>
+            <a:r>
+              <a:rPr lang="en-US" sz="2400" dirty="0"/>
+              <a:t> Deshmukh, </a:t>
+            </a:r>
+            <a:r>
+              <a:rPr lang="en-US" sz="2400" dirty="0" err="1"/>
+              <a:t>Eakagra</a:t>
+            </a:r>
+            <a:r>
+              <a:rPr lang="en-US" sz="2400" dirty="0"/>
+              <a:t> </a:t>
+            </a:r>
+            <a:r>
+              <a:rPr lang="en-US" sz="2400" dirty="0" err="1"/>
+              <a:t>Galav</a:t>
+            </a:r>
+            <a:r>
+              <a:rPr lang="en-US" sz="2400" dirty="0"/>
+              <a:t>, Elaine Jennings, </a:t>
+            </a:r>
+            <a:r>
+              <a:rPr lang="en-US" sz="2400" dirty="0" err="1"/>
+              <a:t>Jenica</a:t>
+            </a:r>
+            <a:r>
+              <a:rPr lang="en-US" sz="2400" dirty="0"/>
+              <a:t> Situ, </a:t>
+            </a:r>
+            <a:r>
+              <a:rPr lang="en-US" sz="2400" dirty="0" err="1"/>
+              <a:t>Jenil</a:t>
+            </a:r>
+            <a:r>
+              <a:rPr lang="en-US" sz="2400" dirty="0"/>
+              <a:t> </a:t>
+            </a:r>
+            <a:r>
+              <a:rPr lang="en-US" sz="2400" dirty="0" err="1"/>
+              <a:t>Gathani</a:t>
+            </a:r>
+            <a:r>
+              <a:rPr lang="en-US" sz="2400" dirty="0"/>
+              <a:t>, </a:t>
+            </a:r>
+            <a:r>
+              <a:rPr lang="en-US" sz="2400" dirty="0" err="1"/>
+              <a:t>Manjari</a:t>
+            </a:r>
+            <a:r>
+              <a:rPr lang="en-US" sz="2400" dirty="0"/>
+              <a:t> Kumar, Siraj </a:t>
+            </a:r>
+            <a:r>
+              <a:rPr lang="en-US" sz="2400" dirty="0" err="1"/>
+              <a:t>Cotecha</a:t>
+            </a:r>
+            <a:r>
+              <a:rPr lang="en-US" sz="2400" dirty="0"/>
+              <a:t>, </a:t>
+            </a:r>
+            <a:r>
+              <a:rPr lang="en-US" sz="2400" dirty="0" err="1"/>
+              <a:t>Urvi</a:t>
+            </a:r>
+            <a:r>
+              <a:rPr lang="en-US" sz="2400" dirty="0"/>
+              <a:t> Vaidya</a:t>
             </a:r>
           </a:p>
         </p:txBody>
@@ -4966,7 +5088,7 @@
           </a:ln>
           <a:extLst>
             <a:ext uri="{C572A759-6A51-4108-AA02-DFA0A04FC94B}">
-              <ma14:wrappingTextBoxFlag xmlns:ma14="http://schemas.microsoft.com/office/mac/drawingml/2011/main" xmlns:a14="http://schemas.microsoft.com/office/drawing/2010/main" xmlns:m="http://schemas.openxmlformats.org/officeDocument/2006/math" xmlns="" val="1"/>
+              <ma14:wrappingTextBoxFlag xmlns="" xmlns:m="http://schemas.openxmlformats.org/officeDocument/2006/math" xmlns:a14="http://schemas.microsoft.com/office/drawing/2010/main" xmlns:ma14="http://schemas.microsoft.com/office/mac/drawingml/2011/main" val="1"/>
             </a:ext>
           </a:extLst>
         </p:spPr>
@@ -4999,7 +5121,7 @@
           </a:ln>
           <a:extLst>
             <a:ext uri="{C572A759-6A51-4108-AA02-DFA0A04FC94B}">
-              <ma14:wrappingTextBoxFlag xmlns:ma14="http://schemas.microsoft.com/office/mac/drawingml/2011/main" xmlns:a14="http://schemas.microsoft.com/office/drawing/2010/main" xmlns:m="http://schemas.openxmlformats.org/officeDocument/2006/math" xmlns="" val="1"/>
+              <ma14:wrappingTextBoxFlag xmlns="" xmlns:m="http://schemas.openxmlformats.org/officeDocument/2006/math" xmlns:a14="http://schemas.microsoft.com/office/drawing/2010/main" xmlns:ma14="http://schemas.microsoft.com/office/mac/drawingml/2011/main" val="1"/>
             </a:ext>
           </a:extLst>
         </p:spPr>
@@ -5098,19 +5220,26 @@
               <a:defRPr sz="2880"/>
             </a:pPr>
             <a:r>
+              <a:rPr dirty="0"/>
               <a:t>The focus is on </a:t>
             </a:r>
             <a:r>
-              <a:rPr b="1"/>
+              <a:rPr b="1" dirty="0"/>
               <a:t>education</a:t>
             </a:r>
             <a:r>
+              <a:rPr dirty="0"/>
               <a:t> &amp; </a:t>
             </a:r>
             <a:r>
-              <a:rPr b="1"/>
+              <a:rPr b="1" dirty="0"/>
               <a:t>teamwork</a:t>
             </a:r>
+            <a:r>
+              <a:rPr lang="en-US" b="1" dirty="0"/>
+              <a:t>.</a:t>
+            </a:r>
+            <a:endParaRPr b="1" dirty="0"/>
           </a:p>
           <a:p>
             <a:pPr marL="400050" indent="-400050" defTabSz="525779">
@@ -5120,8 +5249,14 @@
               <a:defRPr sz="2880"/>
             </a:pPr>
             <a:r>
+              <a:rPr dirty="0"/>
               <a:t>Competition is used to frame the event, give a concrete goal to work toward</a:t>
             </a:r>
+            <a:r>
+              <a:rPr lang="en-US" dirty="0"/>
+              <a:t>.</a:t>
+            </a:r>
+            <a:endParaRPr dirty="0"/>
           </a:p>
           <a:p>
             <a:pPr marL="400050" indent="-400050" defTabSz="525779">
@@ -5131,8 +5266,14 @@
               <a:defRPr sz="2880"/>
             </a:pPr>
             <a:r>
+              <a:rPr dirty="0"/>
               <a:t>Please freely share your experience and expertise, help others when you can</a:t>
             </a:r>
+            <a:r>
+              <a:rPr lang="en-US" dirty="0"/>
+              <a:t>.</a:t>
+            </a:r>
+            <a:endParaRPr dirty="0"/>
           </a:p>
           <a:p>
             <a:pPr marL="400050" indent="-400050" defTabSz="525779">
@@ -5142,6 +5283,7 @@
               <a:defRPr sz="2880"/>
             </a:pPr>
             <a:r>
+              <a:rPr dirty="0"/>
               <a:t>What might success look like?</a:t>
             </a:r>
           </a:p>
@@ -5153,8 +5295,14 @@
               <a:defRPr sz="2880"/>
             </a:pPr>
             <a:r>
+              <a:rPr dirty="0"/>
               <a:t>You’ve tackled a real world data set, and done something interesting with it</a:t>
             </a:r>
+            <a:r>
+              <a:rPr lang="en-US" dirty="0"/>
+              <a:t>.</a:t>
+            </a:r>
+            <a:endParaRPr dirty="0"/>
           </a:p>
           <a:p>
             <a:pPr marL="800100" lvl="1" indent="-400050" defTabSz="525779">
@@ -5164,8 +5312,14 @@
               <a:defRPr sz="2880"/>
             </a:pPr>
             <a:r>
+              <a:rPr dirty="0"/>
               <a:t>You’ve learned something new about R and data analysis</a:t>
             </a:r>
+            <a:r>
+              <a:rPr lang="en-US" dirty="0"/>
+              <a:t>.</a:t>
+            </a:r>
+            <a:endParaRPr dirty="0"/>
           </a:p>
           <a:p>
             <a:pPr marL="800100" lvl="1" indent="-400050" defTabSz="525779">
@@ -5175,8 +5329,14 @@
               <a:defRPr sz="2880"/>
             </a:pPr>
             <a:r>
+              <a:rPr dirty="0"/>
               <a:t>You’ve connected with others and grown from the experience</a:t>
             </a:r>
+            <a:r>
+              <a:rPr lang="en-US" dirty="0"/>
+              <a:t>.</a:t>
+            </a:r>
+            <a:endParaRPr dirty="0"/>
           </a:p>
         </p:txBody>
       </p:sp>
@@ -5255,23 +5415,43 @@
           <a:lstStyle/>
           <a:p>
             <a:r>
+              <a:rPr dirty="0"/>
               <a:t>All participants must abide by our code of conduct</a:t>
             </a:r>
-            <a:br/>
-            <a:endParaRPr/>
-          </a:p>
-          <a:p>
-            <a:r>
+            <a:r>
+              <a:rPr lang="en-US" dirty="0"/>
+              <a:t>.</a:t>
+            </a:r>
+            <a:br>
+              <a:rPr dirty="0"/>
+            </a:br>
+            <a:endParaRPr dirty="0"/>
+          </a:p>
+          <a:p>
+            <a:r>
+              <a:rPr dirty="0"/>
               <a:t>All work presented by the teams must be based upon work performed at the hackathon</a:t>
             </a:r>
-          </a:p>
-          <a:p>
-            <a:r>
+            <a:r>
+              <a:rPr lang="en-US" dirty="0"/>
+              <a:t>.</a:t>
+            </a:r>
+            <a:endParaRPr dirty="0"/>
+          </a:p>
+          <a:p>
+            <a:r>
+              <a:rPr dirty="0"/>
               <a:t>Feel free to help others, even across teams</a:t>
             </a:r>
-          </a:p>
-          <a:p>
-            <a:r>
+            <a:r>
+              <a:rPr lang="en-US" dirty="0"/>
+              <a:t>.</a:t>
+            </a:r>
+            <a:endParaRPr dirty="0"/>
+          </a:p>
+          <a:p>
+            <a:r>
+              <a:rPr dirty="0"/>
               <a:t>Please be courteous of the facilities, handle your trash, etc.</a:t>
             </a:r>
           </a:p>
@@ -5296,7 +5476,7 @@
           </a:ln>
           <a:extLst>
             <a:ext uri="{C572A759-6A51-4108-AA02-DFA0A04FC94B}">
-              <ma14:wrappingTextBoxFlag xmlns:ma14="http://schemas.microsoft.com/office/mac/drawingml/2011/main" xmlns:a14="http://schemas.microsoft.com/office/drawing/2010/main" xmlns:m="http://schemas.openxmlformats.org/officeDocument/2006/math" xmlns="" val="1"/>
+              <ma14:wrappingTextBoxFlag xmlns="" xmlns:m="http://schemas.openxmlformats.org/officeDocument/2006/math" xmlns:a14="http://schemas.microsoft.com/office/drawing/2010/main" xmlns:ma14="http://schemas.microsoft.com/office/mac/drawingml/2011/main" val="1"/>
             </a:ext>
           </a:extLst>
         </p:spPr>
@@ -5506,7 +5686,7 @@
           <p:nvPr/>
         </p:nvPicPr>
         <p:blipFill>
-          <a:blip r:embed="rId2">
+          <a:blip r:embed="rId3">
             <a:extLst>
               <a:ext uri="{28A0092B-C50C-407E-A947-70E740481C1C}">
                 <a14:useLocalDpi xmlns:a14="http://schemas.microsoft.com/office/drawing/2010/main" val="0"/>
@@ -5666,7 +5846,7 @@
           </a:ln>
           <a:extLst>
             <a:ext uri="{C572A759-6A51-4108-AA02-DFA0A04FC94B}">
-              <ma14:wrappingTextBoxFlag xmlns:ma14="http://schemas.microsoft.com/office/mac/drawingml/2011/main" xmlns:a14="http://schemas.microsoft.com/office/drawing/2010/main" xmlns:m="http://schemas.openxmlformats.org/officeDocument/2006/math" xmlns="" val="1"/>
+              <ma14:wrappingTextBoxFlag xmlns="" xmlns:m="http://schemas.openxmlformats.org/officeDocument/2006/math" xmlns:a14="http://schemas.microsoft.com/office/drawing/2010/main" xmlns:ma14="http://schemas.microsoft.com/office/mac/drawingml/2011/main" val="1"/>
             </a:ext>
           </a:extLst>
         </p:spPr>
@@ -5730,7 +5910,7 @@
           </a:ln>
           <a:extLst>
             <a:ext uri="{C572A759-6A51-4108-AA02-DFA0A04FC94B}">
-              <ma14:wrappingTextBoxFlag xmlns:ma14="http://schemas.microsoft.com/office/mac/drawingml/2011/main" xmlns:a14="http://schemas.microsoft.com/office/drawing/2010/main" xmlns:m="http://schemas.openxmlformats.org/officeDocument/2006/math" xmlns="" val="1"/>
+              <ma14:wrappingTextBoxFlag xmlns="" xmlns:m="http://schemas.openxmlformats.org/officeDocument/2006/math" xmlns:a14="http://schemas.microsoft.com/office/drawing/2010/main" xmlns:ma14="http://schemas.microsoft.com/office/mac/drawingml/2011/main" val="1"/>
             </a:ext>
           </a:extLst>
         </p:spPr>
@@ -5828,6 +6008,11 @@
               <a:rPr dirty="0"/>
               <a:t>Everyone needs to be on a team with 2 — 5 people</a:t>
             </a:r>
+            <a:r>
+              <a:rPr lang="en-US" dirty="0"/>
+              <a:t>.</a:t>
+            </a:r>
+            <a:endParaRPr dirty="0"/>
           </a:p>
           <a:p>
             <a:pPr>
@@ -5840,6 +6025,11 @@
               <a:rPr dirty="0"/>
               <a:t>We encourage teams to have 5 people</a:t>
             </a:r>
+            <a:r>
+              <a:rPr lang="en-US" dirty="0"/>
+              <a:t>.</a:t>
+            </a:r>
+            <a:endParaRPr dirty="0"/>
           </a:p>
           <a:p>
             <a:pPr>
@@ -5852,6 +6042,11 @@
               <a:rPr dirty="0"/>
               <a:t>For teams already formed with less than 5 people, consider inviting additional people to join you</a:t>
             </a:r>
+            <a:r>
+              <a:rPr lang="en-US" dirty="0"/>
+              <a:t>.</a:t>
+            </a:r>
+            <a:endParaRPr dirty="0"/>
           </a:p>
           <a:p>
             <a:pPr>
@@ -5865,7 +6060,7 @@
             </a:pPr>
             <a:r>
               <a:rPr lang="en-US" dirty="0"/>
-              <a:t>Let the organizers know if you need help finding a team</a:t>
+              <a:t>Let the organizers know if you need help finding a team.</a:t>
             </a:r>
             <a:endParaRPr dirty="0"/>
           </a:p>
@@ -5942,35 +6137,56 @@
           <a:lstStyle/>
           <a:p>
             <a:r>
+              <a:rPr dirty="0"/>
               <a:t>All teams will submit a </a:t>
             </a:r>
             <a:r>
-              <a:rPr b="1"/>
+              <a:rPr b="1" dirty="0"/>
               <a:t>short 2 - 3 page PDF summary</a:t>
             </a:r>
             <a:r>
+              <a:rPr dirty="0"/>
               <a:t> of their findings</a:t>
             </a:r>
-          </a:p>
-          <a:p>
-            <a:r>
+            <a:r>
+              <a:rPr lang="en-US" dirty="0"/>
+              <a:t>.</a:t>
+            </a:r>
+            <a:endParaRPr dirty="0"/>
+          </a:p>
+          <a:p>
+            <a:r>
+              <a:rPr dirty="0"/>
               <a:t>Teams will have </a:t>
             </a:r>
             <a:r>
-              <a:rPr b="1"/>
+              <a:rPr b="1" dirty="0"/>
               <a:t>5 minutes to present</a:t>
             </a:r>
             <a:r>
+              <a:rPr dirty="0"/>
               <a:t> their work</a:t>
             </a:r>
-          </a:p>
-          <a:p>
-            <a:r>
+            <a:r>
+              <a:rPr lang="en-US" dirty="0"/>
+              <a:t>.</a:t>
+            </a:r>
+            <a:endParaRPr dirty="0"/>
+          </a:p>
+          <a:p>
+            <a:r>
+              <a:rPr dirty="0"/>
               <a:t>The panel of judges will review the work and decide on the awards</a:t>
             </a:r>
-          </a:p>
-          <a:p>
-            <a:r>
+            <a:r>
+              <a:rPr lang="en-US" dirty="0"/>
+              <a:t>.</a:t>
+            </a:r>
+            <a:endParaRPr dirty="0"/>
+          </a:p>
+          <a:p>
+            <a:r>
+              <a:rPr dirty="0"/>
               <a:t>Try to have a good idea about what you’ll be presenting by Saturday night!</a:t>
             </a:r>
           </a:p>

</xml_diff>